<commit_message>
Add 'other models' slide.
</commit_message>
<xml_diff>
--- a/Introduction/Part_0/Data Science 101.pptx
+++ b/Introduction/Part_0/Data Science 101.pptx
@@ -5,7 +5,7 @@
     <p:sldMasterId id="2147483660" r:id="rId1"/>
   </p:sldMasterIdLst>
   <p:notesMasterIdLst>
-    <p:notesMasterId r:id="rId30"/>
+    <p:notesMasterId r:id="rId31"/>
   </p:notesMasterIdLst>
   <p:sldIdLst>
     <p:sldId id="887" r:id="rId2"/>
@@ -36,6 +36,7 @@
     <p:sldId id="917" r:id="rId27"/>
     <p:sldId id="918" r:id="rId28"/>
     <p:sldId id="919" r:id="rId29"/>
+    <p:sldId id="920" r:id="rId30"/>
   </p:sldIdLst>
   <p:sldSz cx="9144000" cy="5143500" type="screen16x9"/>
   <p:notesSz cx="6858000" cy="9144000"/>
@@ -6559,9 +6560,10 @@
           <a:p>
             <a:pPr lvl="1"/>
             <a:r>
-              <a:rPr lang="en-US" dirty="0"/>
-              <a:t>Inherent error</a:t>
-            </a:r>
+              <a:rPr lang="en-US"/>
+              <a:t>Inherent noise</a:t>
+            </a:r>
+            <a:endParaRPr lang="en-US" dirty="0"/>
           </a:p>
           <a:p>
             <a:r>
@@ -8843,13 +8845,8 @@
           <a:p>
             <a:r>
               <a:rPr lang="en-US" sz="1800" dirty="0"/>
-              <a:t>Whatever the </a:t>
-            </a:r>
-            <a:r>
-              <a:rPr lang="en-US" sz="1800"/>
-              <a:t>business needs</a:t>
-            </a:r>
-            <a:endParaRPr lang="en-US" sz="1800" dirty="0"/>
+              <a:t>Whatever the business needs</a:t>
+            </a:r>
           </a:p>
           <a:p>
             <a:pPr marL="0" indent="0">
@@ -8866,6 +8863,316 @@
     <p:extLst>
       <p:ext uri="{BB962C8B-B14F-4D97-AF65-F5344CB8AC3E}">
         <p14:creationId xmlns:p14="http://schemas.microsoft.com/office/powerpoint/2010/main" val="2885215196"/>
+      </p:ext>
+    </p:extLst>
+  </p:cSld>
+  <p:clrMapOvr>
+    <a:masterClrMapping/>
+  </p:clrMapOvr>
+</p:sld>
+</file>
+
+<file path=ppt/slides/slide29.xml><?xml version="1.0" encoding="utf-8"?>
+<p:sld xmlns:a="http://schemas.openxmlformats.org/drawingml/2006/main" xmlns:r="http://schemas.openxmlformats.org/officeDocument/2006/relationships" xmlns:p="http://schemas.openxmlformats.org/presentationml/2006/main">
+  <p:cSld>
+    <p:bg>
+      <p:bgPr>
+        <a:solidFill>
+          <a:schemeClr val="bg1"/>
+        </a:solidFill>
+        <a:effectLst/>
+      </p:bgPr>
+    </p:bg>
+    <p:spTree>
+      <p:nvGrpSpPr>
+        <p:cNvPr id="1" name=""/>
+        <p:cNvGrpSpPr/>
+        <p:nvPr/>
+      </p:nvGrpSpPr>
+      <p:grpSpPr>
+        <a:xfrm>
+          <a:off x="0" y="0"/>
+          <a:ext cx="0" cy="0"/>
+          <a:chOff x="0" y="0"/>
+          <a:chExt cx="0" cy="0"/>
+        </a:xfrm>
+      </p:grpSpPr>
+      <p:sp>
+        <p:nvSpPr>
+          <p:cNvPr id="48" name="Rectangle 47">
+            <a:extLst>
+              <a:ext uri="{FF2B5EF4-FFF2-40B4-BE49-F238E27FC236}">
+                <a16:creationId xmlns:a16="http://schemas.microsoft.com/office/drawing/2014/main" id="{823AC064-BC96-4F32-8AE1-B2FD38754823}"/>
+              </a:ext>
+              <a:ext uri="{C183D7F6-B498-43B3-948B-1728B52AA6E4}">
+                <adec:decorative xmlns:adec="http://schemas.microsoft.com/office/drawing/2017/decorative" val="1"/>
+              </a:ext>
+            </a:extLst>
+          </p:cNvPr>
+          <p:cNvSpPr>
+            <a:spLocks noGrp="1" noRot="1" noChangeAspect="1" noMove="1" noResize="1" noEditPoints="1" noAdjustHandles="1" noChangeArrowheads="1" noChangeShapeType="1" noTextEdit="1"/>
+          </p:cNvSpPr>
+          <p:nvPr>
+            <p:extLst>
+              <p:ext uri="{386F3935-93C4-4BCD-93E2-E3B085C9AB24}">
+                <p16:designElem xmlns:p16="http://schemas.microsoft.com/office/powerpoint/2015/main" val="1"/>
+              </p:ext>
+            </p:extLst>
+          </p:nvPr>
+        </p:nvSpPr>
+        <p:spPr bwMode="ltGray">
+          <a:xfrm>
+            <a:off x="297661" y="210280"/>
+            <a:ext cx="8579095" cy="1383192"/>
+          </a:xfrm>
+          <a:prstGeom prst="rect">
+            <a:avLst/>
+          </a:prstGeom>
+          <a:solidFill>
+            <a:srgbClr val="404040"/>
+          </a:solidFill>
+          <a:ln w="127000" cap="sq" cmpd="thinThick">
+            <a:solidFill>
+              <a:srgbClr val="404040"/>
+            </a:solidFill>
+          </a:ln>
+        </p:spPr>
+        <p:style>
+          <a:lnRef idx="2">
+            <a:schemeClr val="accent1">
+              <a:shade val="50000"/>
+            </a:schemeClr>
+          </a:lnRef>
+          <a:fillRef idx="1">
+            <a:schemeClr val="accent1"/>
+          </a:fillRef>
+          <a:effectRef idx="0">
+            <a:schemeClr val="accent1"/>
+          </a:effectRef>
+          <a:fontRef idx="minor">
+            <a:schemeClr val="lt1"/>
+          </a:fontRef>
+        </p:style>
+        <p:txBody>
+          <a:bodyPr rtlCol="0" anchor="ctr"/>
+          <a:lstStyle/>
+          <a:p>
+            <a:pPr algn="ctr"/>
+            <a:endParaRPr lang="en-US"/>
+          </a:p>
+        </p:txBody>
+      </p:sp>
+      <p:sp>
+        <p:nvSpPr>
+          <p:cNvPr id="3" name="Title 2">
+            <a:extLst>
+              <a:ext uri="{FF2B5EF4-FFF2-40B4-BE49-F238E27FC236}">
+                <a16:creationId xmlns:a16="http://schemas.microsoft.com/office/drawing/2014/main" id="{950782C7-BA08-4BA6-86AA-1F09EA0B73BC}"/>
+              </a:ext>
+            </a:extLst>
+          </p:cNvPr>
+          <p:cNvSpPr>
+            <a:spLocks noGrp="1"/>
+          </p:cNvSpPr>
+          <p:nvPr>
+            <p:ph type="title"/>
+          </p:nvPr>
+        </p:nvSpPr>
+        <p:spPr>
+          <a:xfrm>
+            <a:off x="409763" y="325158"/>
+            <a:ext cx="8354890" cy="697836"/>
+          </a:xfrm>
+        </p:spPr>
+        <p:txBody>
+          <a:bodyPr vert="horz" lIns="91440" tIns="45720" rIns="91440" bIns="45720" rtlCol="0" anchor="b">
+            <a:normAutofit/>
+          </a:bodyPr>
+          <a:lstStyle/>
+          <a:p>
+            <a:pPr algn="ctr" defTabSz="914400"/>
+            <a:r>
+              <a:rPr lang="en-US" sz="4100" dirty="0">
+                <a:solidFill>
+                  <a:srgbClr val="FFFFFF"/>
+                </a:solidFill>
+                <a:latin typeface="+mj-lt"/>
+                <a:ea typeface="+mj-ea"/>
+                <a:cs typeface="+mj-cs"/>
+              </a:rPr>
+              <a:t>Other Model Types</a:t>
+            </a:r>
+          </a:p>
+        </p:txBody>
+      </p:sp>
+      <p:cxnSp>
+        <p:nvCxnSpPr>
+          <p:cNvPr id="50" name="Straight Connector 49">
+            <a:extLst>
+              <a:ext uri="{FF2B5EF4-FFF2-40B4-BE49-F238E27FC236}">
+                <a16:creationId xmlns:a16="http://schemas.microsoft.com/office/drawing/2014/main" id="{7E7C77BC-7138-40B1-A15B-20F57A494629}"/>
+              </a:ext>
+              <a:ext uri="{C183D7F6-B498-43B3-948B-1728B52AA6E4}">
+                <adec:decorative xmlns:adec="http://schemas.microsoft.com/office/drawing/2017/decorative" val="1"/>
+              </a:ext>
+            </a:extLst>
+          </p:cNvPr>
+          <p:cNvCxnSpPr>
+            <a:cxnSpLocks noGrp="1" noRot="1" noChangeAspect="1" noMove="1" noResize="1" noEditPoints="1" noAdjustHandles="1" noChangeArrowheads="1" noChangeShapeType="1"/>
+          </p:cNvCxnSpPr>
+          <p:nvPr>
+            <p:extLst>
+              <p:ext uri="{386F3935-93C4-4BCD-93E2-E3B085C9AB24}">
+                <p16:designElem xmlns:p16="http://schemas.microsoft.com/office/powerpoint/2015/main" val="1"/>
+              </p:ext>
+            </p:extLst>
+          </p:nvPr>
+        </p:nvCxnSpPr>
+        <p:spPr>
+          <a:xfrm>
+            <a:off x="1672558" y="1141719"/>
+            <a:ext cx="5829300" cy="0"/>
+          </a:xfrm>
+          <a:prstGeom prst="line">
+            <a:avLst/>
+          </a:prstGeom>
+          <a:ln w="22225">
+            <a:solidFill>
+              <a:srgbClr val="D9D9D9"/>
+            </a:solidFill>
+          </a:ln>
+        </p:spPr>
+        <p:style>
+          <a:lnRef idx="1">
+            <a:schemeClr val="accent1"/>
+          </a:lnRef>
+          <a:fillRef idx="0">
+            <a:schemeClr val="accent1"/>
+          </a:fillRef>
+          <a:effectRef idx="0">
+            <a:schemeClr val="accent1"/>
+          </a:effectRef>
+          <a:fontRef idx="minor">
+            <a:schemeClr val="tx1"/>
+          </a:fontRef>
+        </p:style>
+      </p:cxnSp>
+      <p:pic>
+        <p:nvPicPr>
+          <p:cNvPr id="20" name="Picture 19" descr="A screenshot of a cell phone&#10;&#10;Description generated with very high confidence">
+            <a:extLst>
+              <a:ext uri="{FF2B5EF4-FFF2-40B4-BE49-F238E27FC236}">
+                <a16:creationId xmlns:a16="http://schemas.microsoft.com/office/drawing/2014/main" id="{2F313667-FC9F-4BC2-A7C5-F99359218B18}"/>
+              </a:ext>
+            </a:extLst>
+          </p:cNvPr>
+          <p:cNvPicPr>
+            <a:picLocks noChangeAspect="1"/>
+          </p:cNvPicPr>
+          <p:nvPr/>
+        </p:nvPicPr>
+        <p:blipFill>
+          <a:blip r:embed="rId2"/>
+          <a:stretch>
+            <a:fillRect/>
+          </a:stretch>
+        </p:blipFill>
+        <p:spPr>
+          <a:xfrm>
+            <a:off x="741158" y="1820113"/>
+            <a:ext cx="3106972" cy="2998228"/>
+          </a:xfrm>
+          <a:prstGeom prst="rect">
+            <a:avLst/>
+          </a:prstGeom>
+        </p:spPr>
+      </p:pic>
+      <p:cxnSp>
+        <p:nvCxnSpPr>
+          <p:cNvPr id="52" name="Straight Connector 51">
+            <a:extLst>
+              <a:ext uri="{FF2B5EF4-FFF2-40B4-BE49-F238E27FC236}">
+                <a16:creationId xmlns:a16="http://schemas.microsoft.com/office/drawing/2014/main" id="{DB146403-F3D6-484B-B2ED-97F9565D0370}"/>
+              </a:ext>
+              <a:ext uri="{C183D7F6-B498-43B3-948B-1728B52AA6E4}">
+                <adec:decorative xmlns:adec="http://schemas.microsoft.com/office/drawing/2017/decorative" val="1"/>
+              </a:ext>
+            </a:extLst>
+          </p:cNvPr>
+          <p:cNvCxnSpPr>
+            <a:cxnSpLocks noGrp="1" noRot="1" noChangeAspect="1" noMove="1" noResize="1" noEditPoints="1" noAdjustHandles="1" noChangeArrowheads="1" noChangeShapeType="1"/>
+          </p:cNvCxnSpPr>
+          <p:nvPr>
+            <p:extLst>
+              <p:ext uri="{386F3935-93C4-4BCD-93E2-E3B085C9AB24}">
+                <p16:designElem xmlns:p16="http://schemas.microsoft.com/office/powerpoint/2015/main" val="1"/>
+              </p:ext>
+            </p:extLst>
+          </p:nvPr>
+        </p:nvCxnSpPr>
+        <p:spPr>
+          <a:xfrm>
+            <a:off x="4587208" y="1947627"/>
+            <a:ext cx="0" cy="2743200"/>
+          </a:xfrm>
+          <a:prstGeom prst="line">
+            <a:avLst/>
+          </a:prstGeom>
+          <a:ln w="101600" cmpd="dbl">
+            <a:solidFill>
+              <a:srgbClr val="595959"/>
+            </a:solidFill>
+          </a:ln>
+        </p:spPr>
+        <p:style>
+          <a:lnRef idx="1">
+            <a:schemeClr val="accent1"/>
+          </a:lnRef>
+          <a:fillRef idx="0">
+            <a:schemeClr val="accent1"/>
+          </a:fillRef>
+          <a:effectRef idx="0">
+            <a:schemeClr val="accent1"/>
+          </a:effectRef>
+          <a:fontRef idx="minor">
+            <a:schemeClr val="tx1"/>
+          </a:fontRef>
+        </p:style>
+      </p:cxnSp>
+      <p:pic>
+        <p:nvPicPr>
+          <p:cNvPr id="24" name="Picture 23" descr="A screenshot of a cell phone&#10;&#10;Description generated with high confidence">
+            <a:extLst>
+              <a:ext uri="{FF2B5EF4-FFF2-40B4-BE49-F238E27FC236}">
+                <a16:creationId xmlns:a16="http://schemas.microsoft.com/office/drawing/2014/main" id="{606D8B2E-7767-4FC4-B71E-A50375A3EE0C}"/>
+              </a:ext>
+            </a:extLst>
+          </p:cNvPr>
+          <p:cNvPicPr>
+            <a:picLocks noChangeAspect="1"/>
+          </p:cNvPicPr>
+          <p:nvPr/>
+        </p:nvPicPr>
+        <p:blipFill>
+          <a:blip r:embed="rId3"/>
+          <a:stretch>
+            <a:fillRect/>
+          </a:stretch>
+        </p:blipFill>
+        <p:spPr>
+          <a:xfrm>
+            <a:off x="5326287" y="1820113"/>
+            <a:ext cx="3106972" cy="2998228"/>
+          </a:xfrm>
+          <a:prstGeom prst="rect">
+            <a:avLst/>
+          </a:prstGeom>
+        </p:spPr>
+      </p:pic>
+    </p:spTree>
+    <p:extLst>
+      <p:ext uri="{BB962C8B-B14F-4D97-AF65-F5344CB8AC3E}">
+        <p14:creationId xmlns:p14="http://schemas.microsoft.com/office/powerpoint/2010/main" val="3577490087"/>
       </p:ext>
     </p:extLst>
   </p:cSld>

</xml_diff>